<commit_message>
corretto un piccolo errore. Adeso dovremmo davvero essere a posto
</commit_message>
<xml_diff>
--- a/SolarisNetBeansProjects/parti tesi/presentazioneMarcoNanni.pptx
+++ b/SolarisNetBeansProjects/parti tesi/presentazioneMarcoNanni.pptx
@@ -15531,7 +15531,7 @@
         <p:spPr/>
         <p:txBody>
           <a:bodyPr>
-            <a:normAutofit lnSpcReduction="10000"/>
+            <a:normAutofit fontScale="92500"/>
           </a:bodyPr>
           <a:lstStyle/>
           <a:p>
@@ -15582,7 +15582,11 @@
           <a:p>
             <a:r>
               <a:rPr lang="it-IT" dirty="0" smtClean="0"/>
-              <a:t>Realizzazione di </a:t>
+              <a:t>Realizzazione </a:t>
+            </a:r>
+            <a:r>
+              <a:rPr lang="it-IT" smtClean="0"/>
+              <a:t>di uno </a:t>
             </a:r>
             <a:r>
               <a:rPr lang="it-IT" dirty="0" err="1" smtClean="0"/>

</xml_diff>